<commit_message>
Added WPA exercise PCAP
</commit_message>
<xml_diff>
--- a/wifi/Basics of Wifi Security.pptx
+++ b/wifi/Basics of Wifi Security.pptx
@@ -211,7 +211,7 @@
           <a:p>
             <a:fld id="{17010B39-EF52-43B2-B1E1-A4157182F235}" type="datetimeFigureOut">
               <a:rPr lang="en-US" smtClean="0"/>
-              <a:t>8/12/2020</a:t>
+              <a:t>8/13/2020</a:t>
             </a:fld>
             <a:endParaRPr lang="en-US"/>
           </a:p>
@@ -585,6 +585,303 @@
 </p:notes>
 </file>
 
+<file path=ppt/notesSlides/notesSlide2.xml><?xml version="1.0" encoding="utf-8"?>
+<p:notes xmlns:a="http://schemas.openxmlformats.org/drawingml/2006/main" xmlns:r="http://schemas.openxmlformats.org/officeDocument/2006/relationships" xmlns:p="http://schemas.openxmlformats.org/presentationml/2006/main">
+  <p:cSld>
+    <p:spTree>
+      <p:nvGrpSpPr>
+        <p:cNvPr id="1" name=""/>
+        <p:cNvGrpSpPr/>
+        <p:nvPr/>
+      </p:nvGrpSpPr>
+      <p:grpSpPr>
+        <a:xfrm>
+          <a:off x="0" y="0"/>
+          <a:ext cx="0" cy="0"/>
+          <a:chOff x="0" y="0"/>
+          <a:chExt cx="0" cy="0"/>
+        </a:xfrm>
+      </p:grpSpPr>
+      <p:sp>
+        <p:nvSpPr>
+          <p:cNvPr id="2" name="Slide Image Placeholder 1"/>
+          <p:cNvSpPr>
+            <a:spLocks noGrp="1" noRot="1" noChangeAspect="1"/>
+          </p:cNvSpPr>
+          <p:nvPr>
+            <p:ph type="sldImg"/>
+          </p:nvPr>
+        </p:nvSpPr>
+        <p:spPr/>
+      </p:sp>
+      <p:sp>
+        <p:nvSpPr>
+          <p:cNvPr id="3" name="Notes Placeholder 2"/>
+          <p:cNvSpPr>
+            <a:spLocks noGrp="1"/>
+          </p:cNvSpPr>
+          <p:nvPr>
+            <p:ph type="body" idx="1"/>
+          </p:nvPr>
+        </p:nvSpPr>
+        <p:spPr/>
+        <p:txBody>
+          <a:bodyPr/>
+          <a:lstStyle/>
+          <a:p>
+            <a:endParaRPr lang="en-US" dirty="0"/>
+          </a:p>
+        </p:txBody>
+      </p:sp>
+      <p:sp>
+        <p:nvSpPr>
+          <p:cNvPr id="4" name="Slide Number Placeholder 3"/>
+          <p:cNvSpPr>
+            <a:spLocks noGrp="1"/>
+          </p:cNvSpPr>
+          <p:nvPr>
+            <p:ph type="sldNum" sz="quarter" idx="5"/>
+          </p:nvPr>
+        </p:nvSpPr>
+        <p:spPr/>
+        <p:txBody>
+          <a:bodyPr/>
+          <a:lstStyle/>
+          <a:p>
+            <a:fld id="{1BDC3B1D-AF2C-4BE2-9263-0B5C68895F11}" type="slidenum">
+              <a:rPr lang="en-US" smtClean="0"/>
+              <a:t>7</a:t>
+            </a:fld>
+            <a:endParaRPr lang="en-US"/>
+          </a:p>
+        </p:txBody>
+      </p:sp>
+    </p:spTree>
+    <p:extLst>
+      <p:ext uri="{BB962C8B-B14F-4D97-AF65-F5344CB8AC3E}">
+        <p14:creationId xmlns:p14="http://schemas.microsoft.com/office/powerpoint/2010/main" val="3509258490"/>
+      </p:ext>
+    </p:extLst>
+  </p:cSld>
+  <p:clrMapOvr>
+    <a:masterClrMapping/>
+  </p:clrMapOvr>
+</p:notes>
+</file>
+
+<file path=ppt/notesSlides/notesSlide3.xml><?xml version="1.0" encoding="utf-8"?>
+<p:notes xmlns:a="http://schemas.openxmlformats.org/drawingml/2006/main" xmlns:r="http://schemas.openxmlformats.org/officeDocument/2006/relationships" xmlns:p="http://schemas.openxmlformats.org/presentationml/2006/main">
+  <p:cSld>
+    <p:spTree>
+      <p:nvGrpSpPr>
+        <p:cNvPr id="1" name=""/>
+        <p:cNvGrpSpPr/>
+        <p:nvPr/>
+      </p:nvGrpSpPr>
+      <p:grpSpPr>
+        <a:xfrm>
+          <a:off x="0" y="0"/>
+          <a:ext cx="0" cy="0"/>
+          <a:chOff x="0" y="0"/>
+          <a:chExt cx="0" cy="0"/>
+        </a:xfrm>
+      </p:grpSpPr>
+      <p:sp>
+        <p:nvSpPr>
+          <p:cNvPr id="2" name="Slide Image Placeholder 1"/>
+          <p:cNvSpPr>
+            <a:spLocks noGrp="1" noRot="1" noChangeAspect="1"/>
+          </p:cNvSpPr>
+          <p:nvPr>
+            <p:ph type="sldImg"/>
+          </p:nvPr>
+        </p:nvSpPr>
+        <p:spPr/>
+      </p:sp>
+      <p:sp>
+        <p:nvSpPr>
+          <p:cNvPr id="3" name="Notes Placeholder 2"/>
+          <p:cNvSpPr>
+            <a:spLocks noGrp="1"/>
+          </p:cNvSpPr>
+          <p:nvPr>
+            <p:ph type="body" idx="1"/>
+          </p:nvPr>
+        </p:nvSpPr>
+        <p:spPr/>
+        <p:txBody>
+          <a:bodyPr/>
+          <a:lstStyle/>
+          <a:p>
+            <a:r>
+              <a:rPr lang="en-US" dirty="0" err="1"/>
+              <a:t>Cowpatty</a:t>
+            </a:r>
+            <a:r>
+              <a:rPr lang="en-US" dirty="0"/>
+              <a:t> has to be manually installed:</a:t>
+            </a:r>
+          </a:p>
+          <a:p>
+            <a:r>
+              <a:rPr lang="en-US" dirty="0"/>
+              <a:t>$ </a:t>
+            </a:r>
+            <a:r>
+              <a:rPr lang="en-US" dirty="0" err="1"/>
+              <a:t>sudo</a:t>
+            </a:r>
+            <a:r>
+              <a:rPr lang="en-US" dirty="0"/>
+              <a:t> apt-get install </a:t>
+            </a:r>
+            <a:r>
+              <a:rPr lang="en-US" dirty="0" err="1"/>
+              <a:t>cowpatty</a:t>
+            </a:r>
+            <a:endParaRPr lang="en-US" dirty="0"/>
+          </a:p>
+          <a:p>
+            <a:endParaRPr lang="en-US" dirty="0"/>
+          </a:p>
+          <a:p>
+            <a:r>
+              <a:rPr lang="en-US" dirty="0"/>
+              <a:t>You can see the network name by running it through aircrack:</a:t>
+            </a:r>
+            <a:br>
+              <a:rPr lang="en-US" dirty="0"/>
+            </a:br>
+            <a:r>
+              <a:rPr lang="en-US" dirty="0"/>
+              <a:t>$ aircrack-ng wrt4g1.cap</a:t>
+            </a:r>
+          </a:p>
+          <a:p>
+            <a:endParaRPr lang="en-US" dirty="0"/>
+          </a:p>
+          <a:p>
+            <a:r>
+              <a:rPr lang="en-US" dirty="0"/>
+              <a:t>To speed up this exercise: The password contains the word “quick”</a:t>
+            </a:r>
+          </a:p>
+          <a:p>
+            <a:r>
+              <a:rPr lang="en-US" dirty="0"/>
+              <a:t>$ grep quick rockyou.txt &gt; quick.txt</a:t>
+            </a:r>
+          </a:p>
+          <a:p>
+            <a:r>
+              <a:rPr lang="en-US" dirty="0"/>
+              <a:t>$ </a:t>
+            </a:r>
+            <a:r>
+              <a:rPr lang="en-US" dirty="0" err="1">
+                <a:latin typeface="Courier New" panose="02070309020205020404" pitchFamily="49" charset="0"/>
+                <a:cs typeface="Courier New" panose="02070309020205020404" pitchFamily="49" charset="0"/>
+              </a:rPr>
+              <a:t>cowpatty</a:t>
+            </a:r>
+            <a:r>
+              <a:rPr lang="en-US" dirty="0">
+                <a:latin typeface="Courier New" panose="02070309020205020404" pitchFamily="49" charset="0"/>
+                <a:cs typeface="Courier New" panose="02070309020205020404" pitchFamily="49" charset="0"/>
+              </a:rPr>
+              <a:t> -f quick.txt –r </a:t>
+            </a:r>
+            <a:r>
+              <a:rPr lang="en-US" sz="1200" dirty="0">
+                <a:latin typeface="Courier New" panose="02070309020205020404" pitchFamily="49" charset="0"/>
+                <a:cs typeface="Courier New" panose="02070309020205020404" pitchFamily="49" charset="0"/>
+              </a:rPr>
+              <a:t>wpa_wrt4g1</a:t>
+            </a:r>
+            <a:r>
+              <a:rPr lang="en-US" dirty="0">
+                <a:latin typeface="Courier New" panose="02070309020205020404" pitchFamily="49" charset="0"/>
+                <a:cs typeface="Courier New" panose="02070309020205020404" pitchFamily="49" charset="0"/>
+              </a:rPr>
+              <a:t>-01.cap –s wrt4g1</a:t>
+            </a:r>
+          </a:p>
+          <a:p>
+            <a:endParaRPr lang="en-US" dirty="0">
+              <a:latin typeface="Courier New" panose="02070309020205020404" pitchFamily="49" charset="0"/>
+              <a:cs typeface="Courier New" panose="02070309020205020404" pitchFamily="49" charset="0"/>
+            </a:endParaRPr>
+          </a:p>
+          <a:p>
+            <a:r>
+              <a:rPr lang="en-US" b="1" dirty="0">
+                <a:latin typeface="Courier New" panose="02070309020205020404" pitchFamily="49" charset="0"/>
+                <a:cs typeface="Courier New" panose="02070309020205020404" pitchFamily="49" charset="0"/>
+              </a:rPr>
+              <a:t>SPOILER BELOW</a:t>
+            </a:r>
+          </a:p>
+          <a:p>
+            <a:endParaRPr lang="en-US" dirty="0">
+              <a:latin typeface="Courier New" panose="02070309020205020404" pitchFamily="49" charset="0"/>
+              <a:cs typeface="Courier New" panose="02070309020205020404" pitchFamily="49" charset="0"/>
+            </a:endParaRPr>
+          </a:p>
+          <a:p>
+            <a:r>
+              <a:rPr lang="en-US" dirty="0">
+                <a:latin typeface="Courier New" panose="02070309020205020404" pitchFamily="49" charset="0"/>
+                <a:cs typeface="Courier New" panose="02070309020205020404" pitchFamily="49" charset="0"/>
+              </a:rPr>
+              <a:t>Password is </a:t>
+            </a:r>
+            <a:r>
+              <a:rPr lang="en-US" dirty="0" err="1">
+                <a:latin typeface="Courier New" panose="02070309020205020404" pitchFamily="49" charset="0"/>
+                <a:cs typeface="Courier New" panose="02070309020205020404" pitchFamily="49" charset="0"/>
+              </a:rPr>
+              <a:t>quickbrownfox</a:t>
+            </a:r>
+            <a:endParaRPr lang="en-US" dirty="0"/>
+          </a:p>
+        </p:txBody>
+      </p:sp>
+      <p:sp>
+        <p:nvSpPr>
+          <p:cNvPr id="4" name="Slide Number Placeholder 3"/>
+          <p:cNvSpPr>
+            <a:spLocks noGrp="1"/>
+          </p:cNvSpPr>
+          <p:nvPr>
+            <p:ph type="sldNum" sz="quarter" idx="5"/>
+          </p:nvPr>
+        </p:nvSpPr>
+        <p:spPr/>
+        <p:txBody>
+          <a:bodyPr/>
+          <a:lstStyle/>
+          <a:p>
+            <a:fld id="{1BDC3B1D-AF2C-4BE2-9263-0B5C68895F11}" type="slidenum">
+              <a:rPr lang="en-US" smtClean="0"/>
+              <a:t>10</a:t>
+            </a:fld>
+            <a:endParaRPr lang="en-US"/>
+          </a:p>
+        </p:txBody>
+      </p:sp>
+    </p:spTree>
+    <p:extLst>
+      <p:ext uri="{BB962C8B-B14F-4D97-AF65-F5344CB8AC3E}">
+        <p14:creationId xmlns:p14="http://schemas.microsoft.com/office/powerpoint/2010/main" val="2255132981"/>
+      </p:ext>
+    </p:extLst>
+  </p:cSld>
+  <p:clrMapOvr>
+    <a:masterClrMapping/>
+  </p:clrMapOvr>
+</p:notes>
+</file>
+
 <file path=ppt/slideLayouts/slideLayout1.xml><?xml version="1.0" encoding="utf-8"?>
 <p:sldLayout xmlns:a="http://schemas.openxmlformats.org/drawingml/2006/main" xmlns:r="http://schemas.openxmlformats.org/officeDocument/2006/relationships" xmlns:p="http://schemas.openxmlformats.org/presentationml/2006/main" type="title" preserve="1">
   <p:cSld name="Title Slide">
@@ -732,7 +1029,7 @@
           <a:p>
             <a:fld id="{FB1FA754-237C-4F21-8D12-CFA60B014697}" type="datetimeFigureOut">
               <a:rPr lang="en-US" smtClean="0"/>
-              <a:t>8/12/2020</a:t>
+              <a:t>8/13/2020</a:t>
             </a:fld>
             <a:endParaRPr lang="en-US"/>
           </a:p>
@@ -930,7 +1227,7 @@
           <a:p>
             <a:fld id="{FB1FA754-237C-4F21-8D12-CFA60B014697}" type="datetimeFigureOut">
               <a:rPr lang="en-US" smtClean="0"/>
-              <a:t>8/12/2020</a:t>
+              <a:t>8/13/2020</a:t>
             </a:fld>
             <a:endParaRPr lang="en-US"/>
           </a:p>
@@ -1138,7 +1435,7 @@
           <a:p>
             <a:fld id="{FB1FA754-237C-4F21-8D12-CFA60B014697}" type="datetimeFigureOut">
               <a:rPr lang="en-US" smtClean="0"/>
-              <a:t>8/12/2020</a:t>
+              <a:t>8/13/2020</a:t>
             </a:fld>
             <a:endParaRPr lang="en-US"/>
           </a:p>
@@ -1336,7 +1633,7 @@
           <a:p>
             <a:fld id="{FB1FA754-237C-4F21-8D12-CFA60B014697}" type="datetimeFigureOut">
               <a:rPr lang="en-US" smtClean="0"/>
-              <a:t>8/12/2020</a:t>
+              <a:t>8/13/2020</a:t>
             </a:fld>
             <a:endParaRPr lang="en-US"/>
           </a:p>
@@ -1611,7 +1908,7 @@
           <a:p>
             <a:fld id="{FB1FA754-237C-4F21-8D12-CFA60B014697}" type="datetimeFigureOut">
               <a:rPr lang="en-US" smtClean="0"/>
-              <a:t>8/12/2020</a:t>
+              <a:t>8/13/2020</a:t>
             </a:fld>
             <a:endParaRPr lang="en-US"/>
           </a:p>
@@ -1876,7 +2173,7 @@
           <a:p>
             <a:fld id="{FB1FA754-237C-4F21-8D12-CFA60B014697}" type="datetimeFigureOut">
               <a:rPr lang="en-US" smtClean="0"/>
-              <a:t>8/12/2020</a:t>
+              <a:t>8/13/2020</a:t>
             </a:fld>
             <a:endParaRPr lang="en-US"/>
           </a:p>
@@ -2288,7 +2585,7 @@
           <a:p>
             <a:fld id="{FB1FA754-237C-4F21-8D12-CFA60B014697}" type="datetimeFigureOut">
               <a:rPr lang="en-US" smtClean="0"/>
-              <a:t>8/12/2020</a:t>
+              <a:t>8/13/2020</a:t>
             </a:fld>
             <a:endParaRPr lang="en-US"/>
           </a:p>
@@ -2429,7 +2726,7 @@
           <a:p>
             <a:fld id="{FB1FA754-237C-4F21-8D12-CFA60B014697}" type="datetimeFigureOut">
               <a:rPr lang="en-US" smtClean="0"/>
-              <a:t>8/12/2020</a:t>
+              <a:t>8/13/2020</a:t>
             </a:fld>
             <a:endParaRPr lang="en-US"/>
           </a:p>
@@ -2542,7 +2839,7 @@
           <a:p>
             <a:fld id="{FB1FA754-237C-4F21-8D12-CFA60B014697}" type="datetimeFigureOut">
               <a:rPr lang="en-US" smtClean="0"/>
-              <a:t>8/12/2020</a:t>
+              <a:t>8/13/2020</a:t>
             </a:fld>
             <a:endParaRPr lang="en-US"/>
           </a:p>
@@ -2853,7 +3150,7 @@
           <a:p>
             <a:fld id="{FB1FA754-237C-4F21-8D12-CFA60B014697}" type="datetimeFigureOut">
               <a:rPr lang="en-US" smtClean="0"/>
-              <a:t>8/12/2020</a:t>
+              <a:t>8/13/2020</a:t>
             </a:fld>
             <a:endParaRPr lang="en-US"/>
           </a:p>
@@ -3141,7 +3438,7 @@
           <a:p>
             <a:fld id="{FB1FA754-237C-4F21-8D12-CFA60B014697}" type="datetimeFigureOut">
               <a:rPr lang="en-US" smtClean="0"/>
-              <a:t>8/12/2020</a:t>
+              <a:t>8/13/2020</a:t>
             </a:fld>
             <a:endParaRPr lang="en-US"/>
           </a:p>
@@ -3382,7 +3679,7 @@
           <a:p>
             <a:fld id="{FB1FA754-237C-4F21-8D12-CFA60B014697}" type="datetimeFigureOut">
               <a:rPr lang="en-US" smtClean="0"/>
-              <a:t>8/12/2020</a:t>
+              <a:t>8/13/2020</a:t>
             </a:fld>
             <a:endParaRPr lang="en-US"/>
           </a:p>
@@ -3933,7 +4230,7 @@
               <a:rPr lang="en-US" dirty="0">
                 <a:latin typeface="Consolas" panose="020B0609020204030204" pitchFamily="49" charset="0"/>
               </a:rPr>
-              <a:t>wrt54g1</a:t>
+              <a:t>wrt4g1</a:t>
             </a:r>
             <a:r>
               <a:rPr lang="en-US" sz="2800" b="1" dirty="0"/>
@@ -4025,21 +4322,21 @@
                 <a:latin typeface="Courier New" panose="02070309020205020404" pitchFamily="49" charset="0"/>
                 <a:cs typeface="Courier New" panose="02070309020205020404" pitchFamily="49" charset="0"/>
               </a:rPr>
-              <a:t>-ng -c (channel) -w (</a:t>
+              <a:t>-ng -c (channel) -w wpa_wrt4g1 --</a:t>
             </a:r>
             <a:r>
               <a:rPr lang="en-US" sz="2300" dirty="0" err="1">
                 <a:latin typeface="Courier New" panose="02070309020205020404" pitchFamily="49" charset="0"/>
                 <a:cs typeface="Courier New" panose="02070309020205020404" pitchFamily="49" charset="0"/>
               </a:rPr>
-              <a:t>wpa_capture</a:t>
+              <a:t>bssid</a:t>
             </a:r>
             <a:r>
               <a:rPr lang="en-US" sz="2300" dirty="0">
                 <a:latin typeface="Courier New" panose="02070309020205020404" pitchFamily="49" charset="0"/>
                 <a:cs typeface="Courier New" panose="02070309020205020404" pitchFamily="49" charset="0"/>
               </a:rPr>
-              <a:t>) --</a:t>
+              <a:t> (</a:t>
             </a:r>
             <a:r>
               <a:rPr lang="en-US" sz="2300" dirty="0" err="1">
@@ -4053,20 +4350,6 @@
                 <a:latin typeface="Courier New" panose="02070309020205020404" pitchFamily="49" charset="0"/>
                 <a:cs typeface="Courier New" panose="02070309020205020404" pitchFamily="49" charset="0"/>
               </a:rPr>
-              <a:t> (</a:t>
-            </a:r>
-            <a:r>
-              <a:rPr lang="en-US" sz="2300" dirty="0" err="1">
-                <a:latin typeface="Courier New" panose="02070309020205020404" pitchFamily="49" charset="0"/>
-                <a:cs typeface="Courier New" panose="02070309020205020404" pitchFamily="49" charset="0"/>
-              </a:rPr>
-              <a:t>bssid</a:t>
-            </a:r>
-            <a:r>
-              <a:rPr lang="en-US" sz="2300" dirty="0">
-                <a:latin typeface="Courier New" panose="02070309020205020404" pitchFamily="49" charset="0"/>
-                <a:cs typeface="Courier New" panose="02070309020205020404" pitchFamily="49" charset="0"/>
-              </a:rPr>
               <a:t>) (interface)</a:t>
             </a:r>
           </a:p>
@@ -4150,7 +4433,7 @@
                 <a:latin typeface="Courier New" panose="02070309020205020404" pitchFamily="49" charset="0"/>
                 <a:cs typeface="Courier New" panose="02070309020205020404" pitchFamily="49" charset="0"/>
               </a:rPr>
-              <a:t>/share/wordlists/rockyou.txt.gz &gt; ~/rockyou.txt</a:t>
+              <a:t>/share/wordlists/rockyou.txt.gz &gt; rockyou.txt</a:t>
             </a:r>
           </a:p>
           <a:p>
@@ -4169,7 +4452,21 @@
                 <a:latin typeface="Courier New" panose="02070309020205020404" pitchFamily="49" charset="0"/>
                 <a:cs typeface="Courier New" panose="02070309020205020404" pitchFamily="49" charset="0"/>
               </a:rPr>
-              <a:t> -f ~/rockyou.txt –r wpa_capture-01.cap –s wrt54g1</a:t>
+              <a:t> -f rockyou.txt –r </a:t>
+            </a:r>
+            <a:r>
+              <a:rPr lang="en-US" sz="2800" dirty="0">
+                <a:latin typeface="Courier New" panose="02070309020205020404" pitchFamily="49" charset="0"/>
+                <a:cs typeface="Courier New" panose="02070309020205020404" pitchFamily="49" charset="0"/>
+              </a:rPr>
+              <a:t>wpa_wrt4g1</a:t>
+            </a:r>
+            <a:r>
+              <a:rPr lang="en-US" dirty="0">
+                <a:latin typeface="Courier New" panose="02070309020205020404" pitchFamily="49" charset="0"/>
+                <a:cs typeface="Courier New" panose="02070309020205020404" pitchFamily="49" charset="0"/>
+              </a:rPr>
+              <a:t>-01.cap –s wrt4g1</a:t>
             </a:r>
           </a:p>
           <a:p>

</xml_diff>

<commit_message>
Added WEP sample PCAP
</commit_message>
<xml_diff>
--- a/wifi/Basics of Wifi Security.pptx
+++ b/wifi/Basics of Wifi Security.pptx
@@ -211,7 +211,7 @@
           <a:p>
             <a:fld id="{17010B39-EF52-43B2-B1E1-A4157182F235}" type="datetimeFigureOut">
               <a:rPr lang="en-US" smtClean="0"/>
-              <a:t>8/13/2020</a:t>
+              <a:t>8/14/2020</a:t>
             </a:fld>
             <a:endParaRPr lang="en-US"/>
           </a:p>
@@ -629,7 +629,40 @@
           <a:bodyPr/>
           <a:lstStyle/>
           <a:p>
+            <a:r>
+              <a:rPr lang="en-US" dirty="0"/>
+              <a:t>Canned instructions:</a:t>
+            </a:r>
+            <a:br>
+              <a:rPr lang="en-US" dirty="0"/>
+            </a:br>
+            <a:r>
+              <a:rPr lang="en-US" dirty="0"/>
+              <a:t>$ aircrack-ng </a:t>
+            </a:r>
+            <a:r>
+              <a:rPr lang="en-US" dirty="0" err="1"/>
+              <a:t>wep-crack.pcap</a:t>
+            </a:r>
             <a:endParaRPr lang="en-US" dirty="0"/>
+          </a:p>
+          <a:p>
+            <a:endParaRPr lang="en-US" dirty="0"/>
+          </a:p>
+          <a:p>
+            <a:r>
+              <a:rPr lang="en-US" dirty="0"/>
+              <a:t>SPOILER:</a:t>
+            </a:r>
+          </a:p>
+          <a:p>
+            <a:endParaRPr lang="en-US" dirty="0"/>
+          </a:p>
+          <a:p>
+            <a:r>
+              <a:rPr lang="en-US" dirty="0"/>
+              <a:t>Password is: 4D:59:4B:45:59 or MYKEY</a:t>
+            </a:r>
           </a:p>
         </p:txBody>
       </p:sp>
@@ -714,6 +747,18 @@
           <a:lstStyle/>
           <a:p>
             <a:r>
+              <a:rPr lang="en-US" dirty="0"/>
+              <a:t>Another option is to use </a:t>
+            </a:r>
+            <a:r>
+              <a:rPr lang="en-US" dirty="0" err="1"/>
+              <a:t>cowpatty</a:t>
+            </a:r>
+            <a:r>
+              <a:rPr lang="en-US" dirty="0"/>
+              <a:t>. </a:t>
+            </a:r>
+            <a:r>
               <a:rPr lang="en-US" dirty="0" err="1"/>
               <a:t>Cowpatty</a:t>
             </a:r>
@@ -1029,7 +1074,7 @@
           <a:p>
             <a:fld id="{FB1FA754-237C-4F21-8D12-CFA60B014697}" type="datetimeFigureOut">
               <a:rPr lang="en-US" smtClean="0"/>
-              <a:t>8/13/2020</a:t>
+              <a:t>8/14/2020</a:t>
             </a:fld>
             <a:endParaRPr lang="en-US"/>
           </a:p>
@@ -1227,7 +1272,7 @@
           <a:p>
             <a:fld id="{FB1FA754-237C-4F21-8D12-CFA60B014697}" type="datetimeFigureOut">
               <a:rPr lang="en-US" smtClean="0"/>
-              <a:t>8/13/2020</a:t>
+              <a:t>8/14/2020</a:t>
             </a:fld>
             <a:endParaRPr lang="en-US"/>
           </a:p>
@@ -1435,7 +1480,7 @@
           <a:p>
             <a:fld id="{FB1FA754-237C-4F21-8D12-CFA60B014697}" type="datetimeFigureOut">
               <a:rPr lang="en-US" smtClean="0"/>
-              <a:t>8/13/2020</a:t>
+              <a:t>8/14/2020</a:t>
             </a:fld>
             <a:endParaRPr lang="en-US"/>
           </a:p>
@@ -1633,7 +1678,7 @@
           <a:p>
             <a:fld id="{FB1FA754-237C-4F21-8D12-CFA60B014697}" type="datetimeFigureOut">
               <a:rPr lang="en-US" smtClean="0"/>
-              <a:t>8/13/2020</a:t>
+              <a:t>8/14/2020</a:t>
             </a:fld>
             <a:endParaRPr lang="en-US"/>
           </a:p>
@@ -1908,7 +1953,7 @@
           <a:p>
             <a:fld id="{FB1FA754-237C-4F21-8D12-CFA60B014697}" type="datetimeFigureOut">
               <a:rPr lang="en-US" smtClean="0"/>
-              <a:t>8/13/2020</a:t>
+              <a:t>8/14/2020</a:t>
             </a:fld>
             <a:endParaRPr lang="en-US"/>
           </a:p>
@@ -2173,7 +2218,7 @@
           <a:p>
             <a:fld id="{FB1FA754-237C-4F21-8D12-CFA60B014697}" type="datetimeFigureOut">
               <a:rPr lang="en-US" smtClean="0"/>
-              <a:t>8/13/2020</a:t>
+              <a:t>8/14/2020</a:t>
             </a:fld>
             <a:endParaRPr lang="en-US"/>
           </a:p>
@@ -2585,7 +2630,7 @@
           <a:p>
             <a:fld id="{FB1FA754-237C-4F21-8D12-CFA60B014697}" type="datetimeFigureOut">
               <a:rPr lang="en-US" smtClean="0"/>
-              <a:t>8/13/2020</a:t>
+              <a:t>8/14/2020</a:t>
             </a:fld>
             <a:endParaRPr lang="en-US"/>
           </a:p>
@@ -2726,7 +2771,7 @@
           <a:p>
             <a:fld id="{FB1FA754-237C-4F21-8D12-CFA60B014697}" type="datetimeFigureOut">
               <a:rPr lang="en-US" smtClean="0"/>
-              <a:t>8/13/2020</a:t>
+              <a:t>8/14/2020</a:t>
             </a:fld>
             <a:endParaRPr lang="en-US"/>
           </a:p>
@@ -2839,7 +2884,7 @@
           <a:p>
             <a:fld id="{FB1FA754-237C-4F21-8D12-CFA60B014697}" type="datetimeFigureOut">
               <a:rPr lang="en-US" smtClean="0"/>
-              <a:t>8/13/2020</a:t>
+              <a:t>8/14/2020</a:t>
             </a:fld>
             <a:endParaRPr lang="en-US"/>
           </a:p>
@@ -3150,7 +3195,7 @@
           <a:p>
             <a:fld id="{FB1FA754-237C-4F21-8D12-CFA60B014697}" type="datetimeFigureOut">
               <a:rPr lang="en-US" smtClean="0"/>
-              <a:t>8/13/2020</a:t>
+              <a:t>8/14/2020</a:t>
             </a:fld>
             <a:endParaRPr lang="en-US"/>
           </a:p>
@@ -3438,7 +3483,7 @@
           <a:p>
             <a:fld id="{FB1FA754-237C-4F21-8D12-CFA60B014697}" type="datetimeFigureOut">
               <a:rPr lang="en-US" smtClean="0"/>
-              <a:t>8/13/2020</a:t>
+              <a:t>8/14/2020</a:t>
             </a:fld>
             <a:endParaRPr lang="en-US"/>
           </a:p>
@@ -3679,7 +3724,7 @@
           <a:p>
             <a:fld id="{FB1FA754-237C-4F21-8D12-CFA60B014697}" type="datetimeFigureOut">
               <a:rPr lang="en-US" smtClean="0"/>
-              <a:t>8/13/2020</a:t>
+              <a:t>8/14/2020</a:t>
             </a:fld>
             <a:endParaRPr lang="en-US"/>
           </a:p>
@@ -4371,7 +4416,7 @@
               <a:rPr lang="en-US" dirty="0" err="1">
                 <a:latin typeface="Consolas" panose="020B0609020204030204" pitchFamily="49" charset="0"/>
               </a:rPr>
-              <a:t>cowpatty</a:t>
+              <a:t>hashcat</a:t>
             </a:r>
             <a:r>
               <a:rPr lang="en-US" dirty="0"/>
@@ -4392,81 +4437,134 @@
             </a:pPr>
             <a:r>
               <a:rPr lang="en-US" dirty="0">
-                <a:latin typeface="Courier New" panose="02070309020205020404" pitchFamily="49" charset="0"/>
-                <a:cs typeface="Courier New" panose="02070309020205020404" pitchFamily="49" charset="0"/>
-              </a:rPr>
-              <a:t>Choose a wordlist</a:t>
-            </a:r>
-          </a:p>
-          <a:p>
-            <a:pPr lvl="1"/>
+                <a:cs typeface="Courier New" panose="02070309020205020404" pitchFamily="49" charset="0"/>
+              </a:rPr>
+              <a:t>Convert the PCAP into </a:t>
+            </a:r>
+            <a:r>
+              <a:rPr lang="en-US" dirty="0" err="1">
+                <a:cs typeface="Courier New" panose="02070309020205020404" pitchFamily="49" charset="0"/>
+              </a:rPr>
+              <a:t>hashcat’s</a:t>
+            </a:r>
+            <a:r>
+              <a:rPr lang="en-US" dirty="0">
+                <a:cs typeface="Courier New" panose="02070309020205020404" pitchFamily="49" charset="0"/>
+              </a:rPr>
+              <a:t> format: </a:t>
+            </a:r>
             <a:r>
               <a:rPr lang="en-US" dirty="0">
                 <a:latin typeface="Courier New" panose="02070309020205020404" pitchFamily="49" charset="0"/>
                 <a:cs typeface="Courier New" panose="02070309020205020404" pitchFamily="49" charset="0"/>
               </a:rPr>
-              <a:t>E.g., </a:t>
+              <a:t>aircrack-ng wpa_wrt4g1-01.cap -j </a:t>
             </a:r>
             <a:r>
               <a:rPr lang="en-US" dirty="0" err="1">
                 <a:latin typeface="Courier New" panose="02070309020205020404" pitchFamily="49" charset="0"/>
                 <a:cs typeface="Courier New" panose="02070309020205020404" pitchFamily="49" charset="0"/>
               </a:rPr>
-              <a:t>zcat</a:t>
-            </a:r>
-            <a:r>
-              <a:rPr lang="en-US" dirty="0">
-                <a:latin typeface="Courier New" panose="02070309020205020404" pitchFamily="49" charset="0"/>
-                <a:cs typeface="Courier New" panose="02070309020205020404" pitchFamily="49" charset="0"/>
-              </a:rPr>
-              <a:t> /</a:t>
-            </a:r>
-            <a:r>
-              <a:rPr lang="en-US" dirty="0" err="1">
-                <a:latin typeface="Courier New" panose="02070309020205020404" pitchFamily="49" charset="0"/>
-                <a:cs typeface="Courier New" panose="02070309020205020404" pitchFamily="49" charset="0"/>
-              </a:rPr>
-              <a:t>usr</a:t>
-            </a:r>
-            <a:r>
-              <a:rPr lang="en-US" dirty="0">
-                <a:latin typeface="Courier New" panose="02070309020205020404" pitchFamily="49" charset="0"/>
-                <a:cs typeface="Courier New" panose="02070309020205020404" pitchFamily="49" charset="0"/>
-              </a:rPr>
-              <a:t>/share/wordlists/rockyou.txt.gz &gt; rockyou.txt</a:t>
-            </a:r>
+              <a:t>wpa</a:t>
+            </a:r>
+            <a:endParaRPr lang="en-US" dirty="0">
+              <a:latin typeface="Courier New" panose="02070309020205020404" pitchFamily="49" charset="0"/>
+              <a:cs typeface="Courier New" panose="02070309020205020404" pitchFamily="49" charset="0"/>
+            </a:endParaRPr>
           </a:p>
           <a:p>
             <a:pPr marL="514350" indent="-514350">
               <a:buAutoNum type="arabicParenR"/>
             </a:pPr>
             <a:r>
+              <a:rPr lang="en-US" dirty="0">
+                <a:cs typeface="Courier New" panose="02070309020205020404" pitchFamily="49" charset="0"/>
+              </a:rPr>
+              <a:t>Choose a wordlist</a:t>
+            </a:r>
+          </a:p>
+          <a:p>
+            <a:pPr lvl="1"/>
+            <a:r>
+              <a:rPr lang="en-US" dirty="0">
+                <a:latin typeface="Courier New" panose="02070309020205020404" pitchFamily="49" charset="0"/>
+                <a:cs typeface="Courier New" panose="02070309020205020404" pitchFamily="49" charset="0"/>
+              </a:rPr>
+              <a:t>E.g., </a:t>
+            </a:r>
+            <a:r>
               <a:rPr lang="en-US" dirty="0" err="1">
                 <a:latin typeface="Courier New" panose="02070309020205020404" pitchFamily="49" charset="0"/>
                 <a:cs typeface="Courier New" panose="02070309020205020404" pitchFamily="49" charset="0"/>
               </a:rPr>
-              <a:t>cowpatty</a:t>
+              <a:t>zcat</a:t>
             </a:r>
             <a:r>
               <a:rPr lang="en-US" dirty="0">
                 <a:latin typeface="Courier New" panose="02070309020205020404" pitchFamily="49" charset="0"/>
                 <a:cs typeface="Courier New" panose="02070309020205020404" pitchFamily="49" charset="0"/>
               </a:rPr>
-              <a:t> -f rockyou.txt –r </a:t>
-            </a:r>
-            <a:r>
-              <a:rPr lang="en-US" sz="2800" dirty="0">
+              <a:t> /</a:t>
+            </a:r>
+            <a:r>
+              <a:rPr lang="en-US" dirty="0" err="1">
                 <a:latin typeface="Courier New" panose="02070309020205020404" pitchFamily="49" charset="0"/>
                 <a:cs typeface="Courier New" panose="02070309020205020404" pitchFamily="49" charset="0"/>
               </a:rPr>
-              <a:t>wpa_wrt4g1</a:t>
+              <a:t>usr</a:t>
             </a:r>
             <a:r>
               <a:rPr lang="en-US" dirty="0">
                 <a:latin typeface="Courier New" panose="02070309020205020404" pitchFamily="49" charset="0"/>
                 <a:cs typeface="Courier New" panose="02070309020205020404" pitchFamily="49" charset="0"/>
               </a:rPr>
-              <a:t>-01.cap –s wrt4g1</a:t>
+              <a:t>/share/wordlists/rockyou.txt.gz &gt; rockyou.txt</a:t>
+            </a:r>
+          </a:p>
+          <a:p>
+            <a:pPr marL="514350" indent="-514350">
+              <a:buFont typeface="+mj-lt"/>
+              <a:buAutoNum type="arabicParenR"/>
+            </a:pPr>
+            <a:r>
+              <a:rPr lang="en-US" dirty="0"/>
+              <a:t>Run </a:t>
+            </a:r>
+            <a:r>
+              <a:rPr lang="en-US" dirty="0" err="1"/>
+              <a:t>hashcat</a:t>
+            </a:r>
+            <a:r>
+              <a:rPr lang="en-US" dirty="0"/>
+              <a:t>:  </a:t>
+            </a:r>
+            <a:r>
+              <a:rPr lang="en-US" sz="2400" dirty="0" err="1">
+                <a:latin typeface="Courier New" panose="02070309020205020404" pitchFamily="49" charset="0"/>
+                <a:cs typeface="Courier New" panose="02070309020205020404" pitchFamily="49" charset="0"/>
+              </a:rPr>
+              <a:t>hashcat</a:t>
+            </a:r>
+            <a:r>
+              <a:rPr lang="en-US" sz="2400" dirty="0">
+                <a:latin typeface="Courier New" panose="02070309020205020404" pitchFamily="49" charset="0"/>
+                <a:cs typeface="Courier New" panose="02070309020205020404" pitchFamily="49" charset="0"/>
+              </a:rPr>
+              <a:t> --force -m 2500 </a:t>
+            </a:r>
+            <a:r>
+              <a:rPr lang="en-US" sz="2400" dirty="0" err="1">
+                <a:latin typeface="Courier New" panose="02070309020205020404" pitchFamily="49" charset="0"/>
+                <a:cs typeface="Courier New" panose="02070309020205020404" pitchFamily="49" charset="0"/>
+              </a:rPr>
+              <a:t>wpa.hccapx</a:t>
+            </a:r>
+            <a:r>
+              <a:rPr lang="en-US" sz="2400" dirty="0">
+                <a:latin typeface="Courier New" panose="02070309020205020404" pitchFamily="49" charset="0"/>
+                <a:cs typeface="Courier New" panose="02070309020205020404" pitchFamily="49" charset="0"/>
+              </a:rPr>
+              <a:t> rockyou.txt --show</a:t>
             </a:r>
           </a:p>
           <a:p>

</xml_diff>